<commit_message>
Documentation updates for release 2019.2 Notes: * Sage300UIWizardPackage.vsix rebuilt so screenshots could be extracted * Sage300Sdk_CodeGenerationWizard.docx has a couple of TODO placeholders for two new option checkboxes (related to new grid and finder)
</commit_message>
<xml_diff>
--- a/docs/presentations/Sage300SDK_20192WebSDKOverview.pptx
+++ b/docs/presentations/Sage300SDK_20192WebSDKOverview.pptx
@@ -211,7 +211,7 @@
           <a:p>
             <a:fld id="{F8DE098C-C2B2-472C-9728-F51906A9149D}" type="datetimeFigureOut">
               <a:rPr lang="en-US" smtClean="0"/>
-              <a:t>2/11/2019</a:t>
+              <a:t>3/27/2019</a:t>
             </a:fld>
             <a:endParaRPr lang="en-US"/>
           </a:p>
@@ -2548,7 +2548,7 @@
                 </a:solidFill>
               </a:rPr>
               <a:pPr/>
-              <a:t>2019/02/11</a:t>
+              <a:t>2019/03/27</a:t>
             </a:fld>
             <a:endParaRPr lang="en-US">
               <a:solidFill>
@@ -2853,7 +2853,7 @@
                 </a:solidFill>
               </a:rPr>
               <a:pPr/>
-              <a:t>2019/02/11</a:t>
+              <a:t>2019/03/27</a:t>
             </a:fld>
             <a:endParaRPr lang="en-US">
               <a:solidFill>
@@ -3090,7 +3090,7 @@
             <a:fld id="{EE1C84F4-270C-2249-89D9-A705BDADDAAB}" type="datetime1">
               <a:rPr lang="en-ZA" smtClean="0"/>
               <a:pPr/>
-              <a:t>2019/02/11</a:t>
+              <a:t>2019/03/27</a:t>
             </a:fld>
             <a:endParaRPr lang="en-US"/>
           </a:p>
@@ -3429,7 +3429,7 @@
             <a:fld id="{2AE6851E-022E-D141-8BE0-1745E9557F71}" type="datetime1">
               <a:rPr lang="en-ZA" smtClean="0"/>
               <a:pPr/>
-              <a:t>2019/02/11</a:t>
+              <a:t>2019/03/27</a:t>
             </a:fld>
             <a:endParaRPr lang="en-US"/>
           </a:p>
@@ -5356,6 +5356,13 @@
             <a:r>
               <a:rPr lang="en-US" sz="2000" dirty="0"/>
               <a:t>Global Files updated to 2019.2</a:t>
+            </a:r>
+          </a:p>
+          <a:p>
+            <a:pPr lvl="1"/>
+            <a:r>
+              <a:rPr lang="en-US" sz="2000" dirty="0"/>
+              <a:t>All projects in solution upgraded to target Microsoft .NET Framework V4.7.2</a:t>
             </a:r>
           </a:p>
           <a:p>

</xml_diff>